<commit_message>
asm variables, all parameters
</commit_message>
<xml_diff>
--- a/presentation.pptx
+++ b/presentation.pptx
@@ -18,9 +18,9 @@
     <p:sldId id="265" r:id="rId12"/>
     <p:sldId id="266" r:id="rId13"/>
     <p:sldId id="267" r:id="rId14"/>
-    <p:sldId id="268" r:id="rId15"/>
-    <p:sldId id="271" r:id="rId16"/>
-    <p:sldId id="272" r:id="rId17"/>
+    <p:sldId id="271" r:id="rId15"/>
+    <p:sldId id="272" r:id="rId16"/>
+    <p:sldId id="268" r:id="rId17"/>
     <p:sldId id="273" r:id="rId18"/>
     <p:sldId id="269" r:id="rId19"/>
     <p:sldId id="270" r:id="rId20"/>
@@ -306,7 +306,7 @@
           <a:p>
             <a:fld id="{AEFF921B-55E9-40C1-A346-3EF7B5CDA012}" type="datetimeFigureOut">
               <a:rPr lang="en-US" smtClean="0"/>
-              <a:t>10/21/2020</a:t>
+              <a:t>10/22/2020</a:t>
             </a:fld>
             <a:endParaRPr lang="en-US"/>
           </a:p>
@@ -476,7 +476,7 @@
           <a:p>
             <a:fld id="{AEFF921B-55E9-40C1-A346-3EF7B5CDA012}" type="datetimeFigureOut">
               <a:rPr lang="en-US" smtClean="0"/>
-              <a:t>10/21/2020</a:t>
+              <a:t>10/22/2020</a:t>
             </a:fld>
             <a:endParaRPr lang="en-US"/>
           </a:p>
@@ -656,7 +656,7 @@
           <a:p>
             <a:fld id="{AEFF921B-55E9-40C1-A346-3EF7B5CDA012}" type="datetimeFigureOut">
               <a:rPr lang="en-US" smtClean="0"/>
-              <a:t>10/21/2020</a:t>
+              <a:t>10/22/2020</a:t>
             </a:fld>
             <a:endParaRPr lang="en-US"/>
           </a:p>
@@ -826,7 +826,7 @@
           <a:p>
             <a:fld id="{AEFF921B-55E9-40C1-A346-3EF7B5CDA012}" type="datetimeFigureOut">
               <a:rPr lang="en-US" smtClean="0"/>
-              <a:t>10/21/2020</a:t>
+              <a:t>10/22/2020</a:t>
             </a:fld>
             <a:endParaRPr lang="en-US"/>
           </a:p>
@@ -1072,7 +1072,7 @@
           <a:p>
             <a:fld id="{AEFF921B-55E9-40C1-A346-3EF7B5CDA012}" type="datetimeFigureOut">
               <a:rPr lang="en-US" smtClean="0"/>
-              <a:t>10/21/2020</a:t>
+              <a:t>10/22/2020</a:t>
             </a:fld>
             <a:endParaRPr lang="en-US"/>
           </a:p>
@@ -1360,7 +1360,7 @@
           <a:p>
             <a:fld id="{AEFF921B-55E9-40C1-A346-3EF7B5CDA012}" type="datetimeFigureOut">
               <a:rPr lang="en-US" smtClean="0"/>
-              <a:t>10/21/2020</a:t>
+              <a:t>10/22/2020</a:t>
             </a:fld>
             <a:endParaRPr lang="en-US"/>
           </a:p>
@@ -1782,7 +1782,7 @@
           <a:p>
             <a:fld id="{AEFF921B-55E9-40C1-A346-3EF7B5CDA012}" type="datetimeFigureOut">
               <a:rPr lang="en-US" smtClean="0"/>
-              <a:t>10/21/2020</a:t>
+              <a:t>10/22/2020</a:t>
             </a:fld>
             <a:endParaRPr lang="en-US"/>
           </a:p>
@@ -1900,7 +1900,7 @@
           <a:p>
             <a:fld id="{AEFF921B-55E9-40C1-A346-3EF7B5CDA012}" type="datetimeFigureOut">
               <a:rPr lang="en-US" smtClean="0"/>
-              <a:t>10/21/2020</a:t>
+              <a:t>10/22/2020</a:t>
             </a:fld>
             <a:endParaRPr lang="en-US"/>
           </a:p>
@@ -1995,7 +1995,7 @@
           <a:p>
             <a:fld id="{AEFF921B-55E9-40C1-A346-3EF7B5CDA012}" type="datetimeFigureOut">
               <a:rPr lang="en-US" smtClean="0"/>
-              <a:t>10/21/2020</a:t>
+              <a:t>10/22/2020</a:t>
             </a:fld>
             <a:endParaRPr lang="en-US"/>
           </a:p>
@@ -2272,7 +2272,7 @@
           <a:p>
             <a:fld id="{AEFF921B-55E9-40C1-A346-3EF7B5CDA012}" type="datetimeFigureOut">
               <a:rPr lang="en-US" smtClean="0"/>
-              <a:t>10/21/2020</a:t>
+              <a:t>10/22/2020</a:t>
             </a:fld>
             <a:endParaRPr lang="en-US"/>
           </a:p>
@@ -2525,7 +2525,7 @@
           <a:p>
             <a:fld id="{AEFF921B-55E9-40C1-A346-3EF7B5CDA012}" type="datetimeFigureOut">
               <a:rPr lang="en-US" smtClean="0"/>
-              <a:t>10/21/2020</a:t>
+              <a:t>10/22/2020</a:t>
             </a:fld>
             <a:endParaRPr lang="en-US"/>
           </a:p>
@@ -2738,7 +2738,7 @@
           <a:p>
             <a:fld id="{AEFF921B-55E9-40C1-A346-3EF7B5CDA012}" type="datetimeFigureOut">
               <a:rPr lang="en-US" smtClean="0"/>
-              <a:t>10/21/2020</a:t>
+              <a:t>10/22/2020</a:t>
             </a:fld>
             <a:endParaRPr lang="en-US"/>
           </a:p>
@@ -3190,6 +3190,13 @@
   <p:clrMapOvr>
     <a:masterClrMapping/>
   </p:clrMapOvr>
+  <p:timing>
+    <p:tnLst>
+      <p:par>
+        <p:cTn id="1" dur="indefinite" restart="never" nodeType="tmRoot"/>
+      </p:par>
+    </p:tnLst>
+  </p:timing>
 </p:sld>
 </file>
 
@@ -3322,6 +3329,13 @@
   <p:clrMapOvr>
     <a:masterClrMapping/>
   </p:clrMapOvr>
+  <p:timing>
+    <p:tnLst>
+      <p:par>
+        <p:cTn id="1" dur="indefinite" restart="never" nodeType="tmRoot"/>
+      </p:par>
+    </p:tnLst>
+  </p:timing>
 </p:sld>
 </file>
 
@@ -3454,6 +3468,13 @@
   <p:clrMapOvr>
     <a:masterClrMapping/>
   </p:clrMapOvr>
+  <p:timing>
+    <p:tnLst>
+      <p:par>
+        <p:cTn id="1" dur="indefinite" restart="never" nodeType="tmRoot"/>
+      </p:par>
+    </p:tnLst>
+  </p:timing>
 </p:sld>
 </file>
 
@@ -3586,6 +3607,13 @@
   <p:clrMapOvr>
     <a:masterClrMapping/>
   </p:clrMapOvr>
+  <p:timing>
+    <p:tnLst>
+      <p:par>
+        <p:cTn id="1" dur="indefinite" restart="never" nodeType="tmRoot"/>
+      </p:par>
+    </p:tnLst>
+  </p:timing>
 </p:sld>
 </file>
 
@@ -3718,10 +3746,303 @@
   <p:clrMapOvr>
     <a:masterClrMapping/>
   </p:clrMapOvr>
+  <p:timing>
+    <p:tnLst>
+      <p:par>
+        <p:cTn id="1" dur="indefinite" restart="never" nodeType="tmRoot"/>
+      </p:par>
+    </p:tnLst>
+  </p:timing>
 </p:sld>
 </file>
 
 <file path=ppt/slides/slide14.xml><?xml version="1.0" encoding="utf-8"?>
+<p:sld xmlns:a="http://schemas.openxmlformats.org/drawingml/2006/main" xmlns:r="http://schemas.openxmlformats.org/officeDocument/2006/relationships" xmlns:p="http://schemas.openxmlformats.org/presentationml/2006/main">
+  <p:cSld>
+    <p:spTree>
+      <p:nvGrpSpPr>
+        <p:cNvPr id="1" name=""/>
+        <p:cNvGrpSpPr/>
+        <p:nvPr/>
+      </p:nvGrpSpPr>
+      <p:grpSpPr>
+        <a:xfrm>
+          <a:off x="0" y="0"/>
+          <a:ext cx="0" cy="0"/>
+          <a:chOff x="0" y="0"/>
+          <a:chExt cx="0" cy="0"/>
+        </a:xfrm>
+      </p:grpSpPr>
+      <p:sp>
+        <p:nvSpPr>
+          <p:cNvPr id="2" name="Tytuł 1"/>
+          <p:cNvSpPr>
+            <a:spLocks noGrp="1"/>
+          </p:cNvSpPr>
+          <p:nvPr>
+            <p:ph type="title"/>
+          </p:nvPr>
+        </p:nvSpPr>
+        <p:spPr/>
+        <p:txBody>
+          <a:bodyPr/>
+          <a:lstStyle/>
+          <a:p>
+            <a:r>
+              <a:rPr lang="en-US" dirty="0" smtClean="0"/>
+              <a:t>Finding the shortest path in a maze</a:t>
+            </a:r>
+            <a:endParaRPr lang="en-US" dirty="0"/>
+          </a:p>
+        </p:txBody>
+      </p:sp>
+      <p:sp>
+        <p:nvSpPr>
+          <p:cNvPr id="3" name="Symbol zastępczy zawartości 2"/>
+          <p:cNvSpPr>
+            <a:spLocks noGrp="1"/>
+          </p:cNvSpPr>
+          <p:nvPr>
+            <p:ph idx="1"/>
+          </p:nvPr>
+        </p:nvSpPr>
+        <p:spPr/>
+        <p:txBody>
+          <a:bodyPr/>
+          <a:lstStyle/>
+          <a:p>
+            <a:endParaRPr lang="en-US" dirty="0"/>
+          </a:p>
+        </p:txBody>
+      </p:sp>
+      <p:pic>
+        <p:nvPicPr>
+          <p:cNvPr id="14339" name="Picture 3"/>
+          <p:cNvPicPr>
+            <a:picLocks noChangeAspect="1" noChangeArrowheads="1"/>
+          </p:cNvPicPr>
+          <p:nvPr/>
+        </p:nvPicPr>
+        <p:blipFill>
+          <a:blip r:embed="rId2">
+            <a:extLst>
+              <a:ext uri="{28A0092B-C50C-407E-A947-70E740481C1C}">
+                <a14:useLocalDpi xmlns:a14="http://schemas.microsoft.com/office/drawing/2010/main" val="0"/>
+              </a:ext>
+            </a:extLst>
+          </a:blip>
+          <a:srcRect/>
+          <a:stretch>
+            <a:fillRect/>
+          </a:stretch>
+        </p:blipFill>
+        <p:spPr bwMode="auto">
+          <a:xfrm>
+            <a:off x="1547664" y="2119312"/>
+            <a:ext cx="6413147" cy="3253903"/>
+          </a:xfrm>
+          <a:prstGeom prst="rect">
+            <a:avLst/>
+          </a:prstGeom>
+          <a:noFill/>
+          <a:ln>
+            <a:noFill/>
+          </a:ln>
+          <a:effectLst/>
+          <a:extLst>
+            <a:ext uri="{909E8E84-426E-40DD-AFC4-6F175D3DCCD1}">
+              <a14:hiddenFill xmlns:a14="http://schemas.microsoft.com/office/drawing/2010/main">
+                <a:solidFill>
+                  <a:schemeClr val="accent1"/>
+                </a:solidFill>
+              </a14:hiddenFill>
+            </a:ext>
+            <a:ext uri="{91240B29-F687-4F45-9708-019B960494DF}">
+              <a14:hiddenLine xmlns:a14="http://schemas.microsoft.com/office/drawing/2010/main" w="9525">
+                <a:solidFill>
+                  <a:schemeClr val="tx1"/>
+                </a:solidFill>
+                <a:miter lim="800000"/>
+                <a:headEnd/>
+                <a:tailEnd/>
+              </a14:hiddenLine>
+            </a:ext>
+            <a:ext uri="{AF507438-7753-43E0-B8FC-AC1667EBCBE1}">
+              <a14:hiddenEffects xmlns:a14="http://schemas.microsoft.com/office/drawing/2010/main">
+                <a:effectLst>
+                  <a:outerShdw dist="35921" dir="2700000" algn="ctr" rotWithShape="0">
+                    <a:schemeClr val="bg2"/>
+                  </a:outerShdw>
+                </a:effectLst>
+              </a14:hiddenEffects>
+            </a:ext>
+          </a:extLst>
+        </p:spPr>
+      </p:pic>
+    </p:spTree>
+    <p:extLst>
+      <p:ext uri="{BB962C8B-B14F-4D97-AF65-F5344CB8AC3E}">
+        <p14:creationId xmlns:p14="http://schemas.microsoft.com/office/powerpoint/2010/main" val="2717487767"/>
+      </p:ext>
+    </p:extLst>
+  </p:cSld>
+  <p:clrMapOvr>
+    <a:masterClrMapping/>
+  </p:clrMapOvr>
+  <p:timing>
+    <p:tnLst>
+      <p:par>
+        <p:cTn id="1" dur="indefinite" restart="never" nodeType="tmRoot"/>
+      </p:par>
+    </p:tnLst>
+  </p:timing>
+</p:sld>
+</file>
+
+<file path=ppt/slides/slide15.xml><?xml version="1.0" encoding="utf-8"?>
+<p:sld xmlns:a="http://schemas.openxmlformats.org/drawingml/2006/main" xmlns:r="http://schemas.openxmlformats.org/officeDocument/2006/relationships" xmlns:p="http://schemas.openxmlformats.org/presentationml/2006/main">
+  <p:cSld>
+    <p:spTree>
+      <p:nvGrpSpPr>
+        <p:cNvPr id="1" name=""/>
+        <p:cNvGrpSpPr/>
+        <p:nvPr/>
+      </p:nvGrpSpPr>
+      <p:grpSpPr>
+        <a:xfrm>
+          <a:off x="0" y="0"/>
+          <a:ext cx="0" cy="0"/>
+          <a:chOff x="0" y="0"/>
+          <a:chExt cx="0" cy="0"/>
+        </a:xfrm>
+      </p:grpSpPr>
+      <p:sp>
+        <p:nvSpPr>
+          <p:cNvPr id="2" name="Tytuł 1"/>
+          <p:cNvSpPr>
+            <a:spLocks noGrp="1"/>
+          </p:cNvSpPr>
+          <p:nvPr>
+            <p:ph type="title"/>
+          </p:nvPr>
+        </p:nvSpPr>
+        <p:spPr/>
+        <p:txBody>
+          <a:bodyPr/>
+          <a:lstStyle/>
+          <a:p>
+            <a:r>
+              <a:rPr lang="en-US" dirty="0" smtClean="0"/>
+              <a:t>Grid as a graph</a:t>
+            </a:r>
+            <a:endParaRPr lang="en-US" dirty="0"/>
+          </a:p>
+        </p:txBody>
+      </p:sp>
+      <p:sp>
+        <p:nvSpPr>
+          <p:cNvPr id="3" name="Symbol zastępczy zawartości 2"/>
+          <p:cNvSpPr>
+            <a:spLocks noGrp="1"/>
+          </p:cNvSpPr>
+          <p:nvPr>
+            <p:ph idx="1"/>
+          </p:nvPr>
+        </p:nvSpPr>
+        <p:spPr/>
+        <p:txBody>
+          <a:bodyPr/>
+          <a:lstStyle/>
+          <a:p>
+            <a:endParaRPr lang="en-US"/>
+          </a:p>
+        </p:txBody>
+      </p:sp>
+      <p:pic>
+        <p:nvPicPr>
+          <p:cNvPr id="15362" name="Picture 2"/>
+          <p:cNvPicPr>
+            <a:picLocks noChangeAspect="1" noChangeArrowheads="1"/>
+          </p:cNvPicPr>
+          <p:nvPr/>
+        </p:nvPicPr>
+        <p:blipFill>
+          <a:blip r:embed="rId2">
+            <a:extLst>
+              <a:ext uri="{28A0092B-C50C-407E-A947-70E740481C1C}">
+                <a14:useLocalDpi xmlns:a14="http://schemas.microsoft.com/office/drawing/2010/main" val="0"/>
+              </a:ext>
+            </a:extLst>
+          </a:blip>
+          <a:srcRect/>
+          <a:stretch>
+            <a:fillRect/>
+          </a:stretch>
+        </p:blipFill>
+        <p:spPr bwMode="auto">
+          <a:xfrm>
+            <a:off x="3005138" y="1643063"/>
+            <a:ext cx="3133725" cy="3571875"/>
+          </a:xfrm>
+          <a:prstGeom prst="rect">
+            <a:avLst/>
+          </a:prstGeom>
+          <a:noFill/>
+          <a:ln>
+            <a:noFill/>
+          </a:ln>
+          <a:effectLst/>
+          <a:extLst>
+            <a:ext uri="{909E8E84-426E-40DD-AFC4-6F175D3DCCD1}">
+              <a14:hiddenFill xmlns:a14="http://schemas.microsoft.com/office/drawing/2010/main">
+                <a:solidFill>
+                  <a:schemeClr val="accent1"/>
+                </a:solidFill>
+              </a14:hiddenFill>
+            </a:ext>
+            <a:ext uri="{91240B29-F687-4F45-9708-019B960494DF}">
+              <a14:hiddenLine xmlns:a14="http://schemas.microsoft.com/office/drawing/2010/main" w="9525">
+                <a:solidFill>
+                  <a:schemeClr val="tx1"/>
+                </a:solidFill>
+                <a:miter lim="800000"/>
+                <a:headEnd/>
+                <a:tailEnd/>
+              </a14:hiddenLine>
+            </a:ext>
+            <a:ext uri="{AF507438-7753-43E0-B8FC-AC1667EBCBE1}">
+              <a14:hiddenEffects xmlns:a14="http://schemas.microsoft.com/office/drawing/2010/main">
+                <a:effectLst>
+                  <a:outerShdw dist="35921" dir="2700000" algn="ctr" rotWithShape="0">
+                    <a:schemeClr val="bg2"/>
+                  </a:outerShdw>
+                </a:effectLst>
+              </a14:hiddenEffects>
+            </a:ext>
+          </a:extLst>
+        </p:spPr>
+      </p:pic>
+    </p:spTree>
+    <p:extLst>
+      <p:ext uri="{BB962C8B-B14F-4D97-AF65-F5344CB8AC3E}">
+        <p14:creationId xmlns:p14="http://schemas.microsoft.com/office/powerpoint/2010/main" val="4018919971"/>
+      </p:ext>
+    </p:extLst>
+  </p:cSld>
+  <p:clrMapOvr>
+    <a:masterClrMapping/>
+  </p:clrMapOvr>
+  <p:timing>
+    <p:tnLst>
+      <p:par>
+        <p:cTn id="1" dur="indefinite" restart="never" nodeType="tmRoot"/>
+      </p:par>
+    </p:tnLst>
+  </p:timing>
+</p:sld>
+</file>
+
+<file path=ppt/slides/slide16.xml><?xml version="1.0" encoding="utf-8"?>
 <p:sld xmlns:a="http://schemas.openxmlformats.org/drawingml/2006/main" xmlns:r="http://schemas.openxmlformats.org/officeDocument/2006/relationships" xmlns:p="http://schemas.openxmlformats.org/presentationml/2006/main">
   <p:cSld>
     <p:spTree>
@@ -3854,278 +4175,13 @@
   <p:clrMapOvr>
     <a:masterClrMapping/>
   </p:clrMapOvr>
-</p:sld>
-</file>
-
-<file path=ppt/slides/slide15.xml><?xml version="1.0" encoding="utf-8"?>
-<p:sld xmlns:a="http://schemas.openxmlformats.org/drawingml/2006/main" xmlns:r="http://schemas.openxmlformats.org/officeDocument/2006/relationships" xmlns:p="http://schemas.openxmlformats.org/presentationml/2006/main">
-  <p:cSld>
-    <p:spTree>
-      <p:nvGrpSpPr>
-        <p:cNvPr id="1" name=""/>
-        <p:cNvGrpSpPr/>
-        <p:nvPr/>
-      </p:nvGrpSpPr>
-      <p:grpSpPr>
-        <a:xfrm>
-          <a:off x="0" y="0"/>
-          <a:ext cx="0" cy="0"/>
-          <a:chOff x="0" y="0"/>
-          <a:chExt cx="0" cy="0"/>
-        </a:xfrm>
-      </p:grpSpPr>
-      <p:sp>
-        <p:nvSpPr>
-          <p:cNvPr id="2" name="Tytuł 1"/>
-          <p:cNvSpPr>
-            <a:spLocks noGrp="1"/>
-          </p:cNvSpPr>
-          <p:nvPr>
-            <p:ph type="title"/>
-          </p:nvPr>
-        </p:nvSpPr>
-        <p:spPr/>
-        <p:txBody>
-          <a:bodyPr/>
-          <a:lstStyle/>
-          <a:p>
-            <a:r>
-              <a:rPr lang="en-US" dirty="0" smtClean="0"/>
-              <a:t>Finding the shortest path in a maze</a:t>
-            </a:r>
-            <a:endParaRPr lang="en-US" dirty="0"/>
-          </a:p>
-        </p:txBody>
-      </p:sp>
-      <p:sp>
-        <p:nvSpPr>
-          <p:cNvPr id="3" name="Symbol zastępczy zawartości 2"/>
-          <p:cNvSpPr>
-            <a:spLocks noGrp="1"/>
-          </p:cNvSpPr>
-          <p:nvPr>
-            <p:ph idx="1"/>
-          </p:nvPr>
-        </p:nvSpPr>
-        <p:spPr/>
-        <p:txBody>
-          <a:bodyPr/>
-          <a:lstStyle/>
-          <a:p>
-            <a:endParaRPr lang="en-US" dirty="0"/>
-          </a:p>
-        </p:txBody>
-      </p:sp>
-      <p:pic>
-        <p:nvPicPr>
-          <p:cNvPr id="14339" name="Picture 3"/>
-          <p:cNvPicPr>
-            <a:picLocks noChangeAspect="1" noChangeArrowheads="1"/>
-          </p:cNvPicPr>
-          <p:nvPr/>
-        </p:nvPicPr>
-        <p:blipFill>
-          <a:blip r:embed="rId2">
-            <a:extLst>
-              <a:ext uri="{28A0092B-C50C-407E-A947-70E740481C1C}">
-                <a14:useLocalDpi xmlns:a14="http://schemas.microsoft.com/office/drawing/2010/main" val="0"/>
-              </a:ext>
-            </a:extLst>
-          </a:blip>
-          <a:srcRect/>
-          <a:stretch>
-            <a:fillRect/>
-          </a:stretch>
-        </p:blipFill>
-        <p:spPr bwMode="auto">
-          <a:xfrm>
-            <a:off x="1547664" y="2119312"/>
-            <a:ext cx="6413147" cy="3253903"/>
-          </a:xfrm>
-          <a:prstGeom prst="rect">
-            <a:avLst/>
-          </a:prstGeom>
-          <a:noFill/>
-          <a:ln>
-            <a:noFill/>
-          </a:ln>
-          <a:effectLst/>
-          <a:extLst>
-            <a:ext uri="{909E8E84-426E-40DD-AFC4-6F175D3DCCD1}">
-              <a14:hiddenFill xmlns:a14="http://schemas.microsoft.com/office/drawing/2010/main">
-                <a:solidFill>
-                  <a:schemeClr val="accent1"/>
-                </a:solidFill>
-              </a14:hiddenFill>
-            </a:ext>
-            <a:ext uri="{91240B29-F687-4F45-9708-019B960494DF}">
-              <a14:hiddenLine xmlns:a14="http://schemas.microsoft.com/office/drawing/2010/main" w="9525">
-                <a:solidFill>
-                  <a:schemeClr val="tx1"/>
-                </a:solidFill>
-                <a:miter lim="800000"/>
-                <a:headEnd/>
-                <a:tailEnd/>
-              </a14:hiddenLine>
-            </a:ext>
-            <a:ext uri="{AF507438-7753-43E0-B8FC-AC1667EBCBE1}">
-              <a14:hiddenEffects xmlns:a14="http://schemas.microsoft.com/office/drawing/2010/main">
-                <a:effectLst>
-                  <a:outerShdw dist="35921" dir="2700000" algn="ctr" rotWithShape="0">
-                    <a:schemeClr val="bg2"/>
-                  </a:outerShdw>
-                </a:effectLst>
-              </a14:hiddenEffects>
-            </a:ext>
-          </a:extLst>
-        </p:spPr>
-      </p:pic>
-    </p:spTree>
-    <p:extLst>
-      <p:ext uri="{BB962C8B-B14F-4D97-AF65-F5344CB8AC3E}">
-        <p14:creationId xmlns:p14="http://schemas.microsoft.com/office/powerpoint/2010/main" val="2717487767"/>
-      </p:ext>
-    </p:extLst>
-  </p:cSld>
-  <p:clrMapOvr>
-    <a:masterClrMapping/>
-  </p:clrMapOvr>
-</p:sld>
-</file>
-
-<file path=ppt/slides/slide16.xml><?xml version="1.0" encoding="utf-8"?>
-<p:sld xmlns:a="http://schemas.openxmlformats.org/drawingml/2006/main" xmlns:r="http://schemas.openxmlformats.org/officeDocument/2006/relationships" xmlns:p="http://schemas.openxmlformats.org/presentationml/2006/main">
-  <p:cSld>
-    <p:spTree>
-      <p:nvGrpSpPr>
-        <p:cNvPr id="1" name=""/>
-        <p:cNvGrpSpPr/>
-        <p:nvPr/>
-      </p:nvGrpSpPr>
-      <p:grpSpPr>
-        <a:xfrm>
-          <a:off x="0" y="0"/>
-          <a:ext cx="0" cy="0"/>
-          <a:chOff x="0" y="0"/>
-          <a:chExt cx="0" cy="0"/>
-        </a:xfrm>
-      </p:grpSpPr>
-      <p:sp>
-        <p:nvSpPr>
-          <p:cNvPr id="2" name="Tytuł 1"/>
-          <p:cNvSpPr>
-            <a:spLocks noGrp="1"/>
-          </p:cNvSpPr>
-          <p:nvPr>
-            <p:ph type="title"/>
-          </p:nvPr>
-        </p:nvSpPr>
-        <p:spPr/>
-        <p:txBody>
-          <a:bodyPr/>
-          <a:lstStyle/>
-          <a:p>
-            <a:r>
-              <a:rPr lang="en-US" dirty="0" smtClean="0"/>
-              <a:t>Grid as a graph</a:t>
-            </a:r>
-            <a:endParaRPr lang="en-US" dirty="0"/>
-          </a:p>
-        </p:txBody>
-      </p:sp>
-      <p:sp>
-        <p:nvSpPr>
-          <p:cNvPr id="3" name="Symbol zastępczy zawartości 2"/>
-          <p:cNvSpPr>
-            <a:spLocks noGrp="1"/>
-          </p:cNvSpPr>
-          <p:nvPr>
-            <p:ph idx="1"/>
-          </p:nvPr>
-        </p:nvSpPr>
-        <p:spPr/>
-        <p:txBody>
-          <a:bodyPr/>
-          <a:lstStyle/>
-          <a:p>
-            <a:endParaRPr lang="en-US"/>
-          </a:p>
-        </p:txBody>
-      </p:sp>
-      <p:pic>
-        <p:nvPicPr>
-          <p:cNvPr id="15362" name="Picture 2"/>
-          <p:cNvPicPr>
-            <a:picLocks noChangeAspect="1" noChangeArrowheads="1"/>
-          </p:cNvPicPr>
-          <p:nvPr/>
-        </p:nvPicPr>
-        <p:blipFill>
-          <a:blip r:embed="rId2">
-            <a:extLst>
-              <a:ext uri="{28A0092B-C50C-407E-A947-70E740481C1C}">
-                <a14:useLocalDpi xmlns:a14="http://schemas.microsoft.com/office/drawing/2010/main" val="0"/>
-              </a:ext>
-            </a:extLst>
-          </a:blip>
-          <a:srcRect/>
-          <a:stretch>
-            <a:fillRect/>
-          </a:stretch>
-        </p:blipFill>
-        <p:spPr bwMode="auto">
-          <a:xfrm>
-            <a:off x="3005138" y="1643063"/>
-            <a:ext cx="3133725" cy="3571875"/>
-          </a:xfrm>
-          <a:prstGeom prst="rect">
-            <a:avLst/>
-          </a:prstGeom>
-          <a:noFill/>
-          <a:ln>
-            <a:noFill/>
-          </a:ln>
-          <a:effectLst/>
-          <a:extLst>
-            <a:ext uri="{909E8E84-426E-40DD-AFC4-6F175D3DCCD1}">
-              <a14:hiddenFill xmlns:a14="http://schemas.microsoft.com/office/drawing/2010/main">
-                <a:solidFill>
-                  <a:schemeClr val="accent1"/>
-                </a:solidFill>
-              </a14:hiddenFill>
-            </a:ext>
-            <a:ext uri="{91240B29-F687-4F45-9708-019B960494DF}">
-              <a14:hiddenLine xmlns:a14="http://schemas.microsoft.com/office/drawing/2010/main" w="9525">
-                <a:solidFill>
-                  <a:schemeClr val="tx1"/>
-                </a:solidFill>
-                <a:miter lim="800000"/>
-                <a:headEnd/>
-                <a:tailEnd/>
-              </a14:hiddenLine>
-            </a:ext>
-            <a:ext uri="{AF507438-7753-43E0-B8FC-AC1667EBCBE1}">
-              <a14:hiddenEffects xmlns:a14="http://schemas.microsoft.com/office/drawing/2010/main">
-                <a:effectLst>
-                  <a:outerShdw dist="35921" dir="2700000" algn="ctr" rotWithShape="0">
-                    <a:schemeClr val="bg2"/>
-                  </a:outerShdw>
-                </a:effectLst>
-              </a14:hiddenEffects>
-            </a:ext>
-          </a:extLst>
-        </p:spPr>
-      </p:pic>
-    </p:spTree>
-    <p:extLst>
-      <p:ext uri="{BB962C8B-B14F-4D97-AF65-F5344CB8AC3E}">
-        <p14:creationId xmlns:p14="http://schemas.microsoft.com/office/powerpoint/2010/main" val="4018919971"/>
-      </p:ext>
-    </p:extLst>
-  </p:cSld>
-  <p:clrMapOvr>
-    <a:masterClrMapping/>
-  </p:clrMapOvr>
+  <p:timing>
+    <p:tnLst>
+      <p:par>
+        <p:cTn id="1" dur="indefinite" restart="never" nodeType="tmRoot"/>
+      </p:par>
+    </p:tnLst>
+  </p:timing>
 </p:sld>
 </file>
 
@@ -4262,6 +4318,13 @@
   <p:clrMapOvr>
     <a:masterClrMapping/>
   </p:clrMapOvr>
+  <p:timing>
+    <p:tnLst>
+      <p:par>
+        <p:cTn id="1" dur="indefinite" restart="never" nodeType="tmRoot"/>
+      </p:par>
+    </p:tnLst>
+  </p:timing>
 </p:sld>
 </file>
 
@@ -4375,6 +4438,13 @@
   <p:clrMapOvr>
     <a:masterClrMapping/>
   </p:clrMapOvr>
+  <p:timing>
+    <p:tnLst>
+      <p:par>
+        <p:cTn id="1" dur="indefinite" restart="never" nodeType="tmRoot"/>
+      </p:par>
+    </p:tnLst>
+  </p:timing>
 </p:sld>
 </file>
 
@@ -4484,6 +4554,13 @@
   <p:clrMapOvr>
     <a:masterClrMapping/>
   </p:clrMapOvr>
+  <p:timing>
+    <p:tnLst>
+      <p:par>
+        <p:cTn id="1" dur="indefinite" restart="never" nodeType="tmRoot"/>
+      </p:par>
+    </p:tnLst>
+  </p:timing>
 </p:sld>
 </file>
 
@@ -4550,8 +4627,27 @@
           <a:p>
             <a:r>
               <a:rPr lang="en-US" dirty="0" smtClean="0"/>
-              <a:t>Is a solution to the single-source shortest path problem in graph theory</a:t>
-            </a:r>
+              <a:t>Is a solution to the single-source shortest path problem in graph </a:t>
+            </a:r>
+            <a:r>
+              <a:rPr lang="en-US" dirty="0" smtClean="0"/>
+              <a:t>theory</a:t>
+            </a:r>
+          </a:p>
+          <a:p>
+            <a:r>
+              <a:rPr lang="en-US" dirty="0" smtClean="0"/>
+              <a:t>Created by Edsger W. </a:t>
+            </a:r>
+            <a:r>
+              <a:rPr lang="en-US" dirty="0" err="1" smtClean="0"/>
+              <a:t>Dijkstra</a:t>
+            </a:r>
+            <a:r>
+              <a:rPr lang="en-US" dirty="0"/>
+              <a:t> in 1956</a:t>
+            </a:r>
+            <a:endParaRPr lang="en-US" dirty="0" smtClean="0"/>
           </a:p>
           <a:p>
             <a:r>
@@ -4562,7 +4658,15 @@
           <a:p>
             <a:r>
               <a:rPr lang="en-US" dirty="0" smtClean="0"/>
-              <a:t>Output – lengths of shortest paths form a given source vertex to all other vertices</a:t>
+              <a:t>Output – lengths of shortest paths </a:t>
+            </a:r>
+            <a:r>
+              <a:rPr lang="en-US" dirty="0" smtClean="0"/>
+              <a:t>from </a:t>
+            </a:r>
+            <a:r>
+              <a:rPr lang="en-US" dirty="0" smtClean="0"/>
+              <a:t>a given source vertex to all other vertices</a:t>
             </a:r>
             <a:endParaRPr lang="en-US" dirty="0"/>
           </a:p>
@@ -4578,6 +4682,13 @@
   <p:clrMapOvr>
     <a:masterClrMapping/>
   </p:clrMapOvr>
+  <p:timing>
+    <p:tnLst>
+      <p:par>
+        <p:cTn id="1" dur="indefinite" restart="never" nodeType="tmRoot"/>
+      </p:par>
+    </p:tnLst>
+  </p:timing>
 </p:sld>
 </file>
 
@@ -4714,6 +4825,13 @@
   <p:clrMapOvr>
     <a:masterClrMapping/>
   </p:clrMapOvr>
+  <p:timing>
+    <p:tnLst>
+      <p:par>
+        <p:cTn id="1" dur="indefinite" restart="never" nodeType="tmRoot"/>
+      </p:par>
+    </p:tnLst>
+  </p:timing>
 </p:sld>
 </file>
 
@@ -4855,6 +4973,13 @@
   <p:clrMapOvr>
     <a:masterClrMapping/>
   </p:clrMapOvr>
+  <p:timing>
+    <p:tnLst>
+      <p:par>
+        <p:cTn id="1" dur="indefinite" restart="never" nodeType="tmRoot"/>
+      </p:par>
+    </p:tnLst>
+  </p:timing>
 </p:sld>
 </file>
 
@@ -4987,6 +5112,13 @@
   <p:clrMapOvr>
     <a:masterClrMapping/>
   </p:clrMapOvr>
+  <p:timing>
+    <p:tnLst>
+      <p:par>
+        <p:cTn id="1" dur="indefinite" restart="never" nodeType="tmRoot"/>
+      </p:par>
+    </p:tnLst>
+  </p:timing>
 </p:sld>
 </file>
 
@@ -5119,6 +5251,13 @@
   <p:clrMapOvr>
     <a:masterClrMapping/>
   </p:clrMapOvr>
+  <p:timing>
+    <p:tnLst>
+      <p:par>
+        <p:cTn id="1" dur="indefinite" restart="never" nodeType="tmRoot"/>
+      </p:par>
+    </p:tnLst>
+  </p:timing>
 </p:sld>
 </file>
 
@@ -5251,6 +5390,13 @@
   <p:clrMapOvr>
     <a:masterClrMapping/>
   </p:clrMapOvr>
+  <p:timing>
+    <p:tnLst>
+      <p:par>
+        <p:cTn id="1" dur="indefinite" restart="never" nodeType="tmRoot"/>
+      </p:par>
+    </p:tnLst>
+  </p:timing>
 </p:sld>
 </file>
 
@@ -5383,6 +5529,13 @@
   <p:clrMapOvr>
     <a:masterClrMapping/>
   </p:clrMapOvr>
+  <p:timing>
+    <p:tnLst>
+      <p:par>
+        <p:cTn id="1" dur="indefinite" restart="never" nodeType="tmRoot"/>
+      </p:par>
+    </p:tnLst>
+  </p:timing>
 </p:sld>
 </file>
 
@@ -5515,6 +5668,13 @@
   <p:clrMapOvr>
     <a:masterClrMapping/>
   </p:clrMapOvr>
+  <p:timing>
+    <p:tnLst>
+      <p:par>
+        <p:cTn id="1" dur="indefinite" restart="never" nodeType="tmRoot"/>
+      </p:par>
+    </p:tnLst>
+  </p:timing>
 </p:sld>
 </file>
 

</xml_diff>